<commit_message>
figure of attack model
</commit_message>
<xml_diff>
--- a/WOOT/Figs/attack model/attack model.pptx
+++ b/WOOT/Figs/attack model/attack model.pptx
@@ -261,7 +261,7 @@
           <a:p>
             <a:fld id="{C3DC5842-34FC-4E31-AF34-C639E88C8B34}" type="datetimeFigureOut">
               <a:rPr lang="zh-CN" altLang="en-US" smtClean="0"/>
-              <a:t>2021/1/29</a:t>
+              <a:t>2021/1/30</a:t>
             </a:fld>
             <a:endParaRPr lang="zh-CN" altLang="en-US"/>
           </a:p>
@@ -459,7 +459,7 @@
           <a:p>
             <a:fld id="{C3DC5842-34FC-4E31-AF34-C639E88C8B34}" type="datetimeFigureOut">
               <a:rPr lang="zh-CN" altLang="en-US" smtClean="0"/>
-              <a:t>2021/1/29</a:t>
+              <a:t>2021/1/30</a:t>
             </a:fld>
             <a:endParaRPr lang="zh-CN" altLang="en-US"/>
           </a:p>
@@ -667,7 +667,7 @@
           <a:p>
             <a:fld id="{C3DC5842-34FC-4E31-AF34-C639E88C8B34}" type="datetimeFigureOut">
               <a:rPr lang="zh-CN" altLang="en-US" smtClean="0"/>
-              <a:t>2021/1/29</a:t>
+              <a:t>2021/1/30</a:t>
             </a:fld>
             <a:endParaRPr lang="zh-CN" altLang="en-US"/>
           </a:p>
@@ -865,7 +865,7 @@
           <a:p>
             <a:fld id="{C3DC5842-34FC-4E31-AF34-C639E88C8B34}" type="datetimeFigureOut">
               <a:rPr lang="zh-CN" altLang="en-US" smtClean="0"/>
-              <a:t>2021/1/29</a:t>
+              <a:t>2021/1/30</a:t>
             </a:fld>
             <a:endParaRPr lang="zh-CN" altLang="en-US"/>
           </a:p>
@@ -1140,7 +1140,7 @@
           <a:p>
             <a:fld id="{C3DC5842-34FC-4E31-AF34-C639E88C8B34}" type="datetimeFigureOut">
               <a:rPr lang="zh-CN" altLang="en-US" smtClean="0"/>
-              <a:t>2021/1/29</a:t>
+              <a:t>2021/1/30</a:t>
             </a:fld>
             <a:endParaRPr lang="zh-CN" altLang="en-US"/>
           </a:p>
@@ -1405,7 +1405,7 @@
           <a:p>
             <a:fld id="{C3DC5842-34FC-4E31-AF34-C639E88C8B34}" type="datetimeFigureOut">
               <a:rPr lang="zh-CN" altLang="en-US" smtClean="0"/>
-              <a:t>2021/1/29</a:t>
+              <a:t>2021/1/30</a:t>
             </a:fld>
             <a:endParaRPr lang="zh-CN" altLang="en-US"/>
           </a:p>
@@ -1817,7 +1817,7 @@
           <a:p>
             <a:fld id="{C3DC5842-34FC-4E31-AF34-C639E88C8B34}" type="datetimeFigureOut">
               <a:rPr lang="zh-CN" altLang="en-US" smtClean="0"/>
-              <a:t>2021/1/29</a:t>
+              <a:t>2021/1/30</a:t>
             </a:fld>
             <a:endParaRPr lang="zh-CN" altLang="en-US"/>
           </a:p>
@@ -1958,7 +1958,7 @@
           <a:p>
             <a:fld id="{C3DC5842-34FC-4E31-AF34-C639E88C8B34}" type="datetimeFigureOut">
               <a:rPr lang="zh-CN" altLang="en-US" smtClean="0"/>
-              <a:t>2021/1/29</a:t>
+              <a:t>2021/1/30</a:t>
             </a:fld>
             <a:endParaRPr lang="zh-CN" altLang="en-US"/>
           </a:p>
@@ -2071,7 +2071,7 @@
           <a:p>
             <a:fld id="{C3DC5842-34FC-4E31-AF34-C639E88C8B34}" type="datetimeFigureOut">
               <a:rPr lang="zh-CN" altLang="en-US" smtClean="0"/>
-              <a:t>2021/1/29</a:t>
+              <a:t>2021/1/30</a:t>
             </a:fld>
             <a:endParaRPr lang="zh-CN" altLang="en-US"/>
           </a:p>
@@ -2382,7 +2382,7 @@
           <a:p>
             <a:fld id="{C3DC5842-34FC-4E31-AF34-C639E88C8B34}" type="datetimeFigureOut">
               <a:rPr lang="zh-CN" altLang="en-US" smtClean="0"/>
-              <a:t>2021/1/29</a:t>
+              <a:t>2021/1/30</a:t>
             </a:fld>
             <a:endParaRPr lang="zh-CN" altLang="en-US"/>
           </a:p>
@@ -2670,7 +2670,7 @@
           <a:p>
             <a:fld id="{C3DC5842-34FC-4E31-AF34-C639E88C8B34}" type="datetimeFigureOut">
               <a:rPr lang="zh-CN" altLang="en-US" smtClean="0"/>
-              <a:t>2021/1/29</a:t>
+              <a:t>2021/1/30</a:t>
             </a:fld>
             <a:endParaRPr lang="zh-CN" altLang="en-US"/>
           </a:p>
@@ -2911,7 +2911,7 @@
           <a:p>
             <a:fld id="{C3DC5842-34FC-4E31-AF34-C639E88C8B34}" type="datetimeFigureOut">
               <a:rPr lang="zh-CN" altLang="en-US" smtClean="0"/>
-              <a:t>2021/1/29</a:t>
+              <a:t>2021/1/30</a:t>
             </a:fld>
             <a:endParaRPr lang="zh-CN" altLang="en-US"/>
           </a:p>
@@ -6240,6 +6240,7 @@
           <a:prstGeom prst="ellipse">
             <a:avLst/>
           </a:prstGeom>
+          <a:ln/>
         </p:spPr>
         <p:style>
           <a:lnRef idx="2">
@@ -6358,7 +6359,7 @@
             <a:pPr algn="ctr"/>
             <a:r>
               <a:rPr lang="en-US" altLang="zh-CN" sz="2000" b="1" dirty="0"/>
-              <a:t>1</a:t>
+              <a:t>3</a:t>
             </a:r>
             <a:endParaRPr lang="zh-CN" altLang="en-US" sz="2000" b="1" dirty="0"/>
           </a:p>
@@ -6384,6 +6385,7 @@
           <a:prstGeom prst="ellipse">
             <a:avLst/>
           </a:prstGeom>
+          <a:ln/>
         </p:spPr>
         <p:style>
           <a:lnRef idx="2">
@@ -6502,7 +6504,7 @@
             <a:pPr algn="ctr"/>
             <a:r>
               <a:rPr lang="en-US" altLang="zh-CN" sz="2000" b="1" dirty="0"/>
-              <a:t>3</a:t>
+              <a:t>1</a:t>
             </a:r>
             <a:endParaRPr lang="zh-CN" altLang="en-US" sz="2000" b="1" dirty="0"/>
           </a:p>
@@ -6528,6 +6530,7 @@
           <a:prstGeom prst="ellipse">
             <a:avLst/>
           </a:prstGeom>
+          <a:ln/>
         </p:spPr>
         <p:style>
           <a:lnRef idx="2">

</xml_diff>